<commit_message>
Adds notes to the DDD-Introduction
</commit_message>
<xml_diff>
--- a/Presentations/DomainDrivenDesign/DDD-Introduction.pptx
+++ b/Presentations/DomainDrivenDesign/DDD-Introduction.pptx
@@ -48,11 +48,11 @@
   <p:notesSz cx="6858000" cy="9144000"/>
   <p:embeddedFontLst>
     <p:embeddedFont>
-      <p:font typeface="Walter Turncoat" panose="020B0604020202020204" charset="0"/>
+      <p:font typeface="Arial Unicode MS" panose="020B0604020202020204" charset="-128"/>
       <p:regular r:id="rId38"/>
     </p:embeddedFont>
     <p:embeddedFont>
-      <p:font typeface="Arial Unicode MS" panose="020B0604020202020204" pitchFamily="34" charset="-128"/>
+      <p:font typeface="Walter Turncoat" panose="020B0604020202020204" charset="0"/>
       <p:regular r:id="rId39"/>
     </p:embeddedFont>
     <p:embeddedFont>
@@ -1352,6 +1352,28 @@
             <a:noAutofit/>
           </a:bodyPr>
           <a:lstStyle/>
+          <a:p>
+            <a:r>
+              <a:rPr lang="en-US" sz="1100" dirty="0">
+                <a:latin typeface="Sniglet" panose="020B0604020202020204" charset="0"/>
+              </a:rPr>
+              <a:t>Community did bad thing. </a:t>
+            </a:r>
+            <a:r>
+              <a:rPr lang="en-US" sz="1100">
+                <a:latin typeface="Sniglet" panose="020B0604020202020204" charset="0"/>
+              </a:rPr>
+              <a:t>Frequent changes</a:t>
+            </a:r>
+            <a:endParaRPr lang="en-US" sz="1100" dirty="0">
+              <a:latin typeface="Sniglet" panose="020B0604020202020204" charset="0"/>
+            </a:endParaRPr>
+          </a:p>
+          <a:p>
+            <a:endParaRPr lang="en-US" sz="1100" dirty="0">
+              <a:latin typeface="Sniglet" panose="020B0604020202020204" charset="0"/>
+            </a:endParaRPr>
+          </a:p>
           <a:p>
             <a:r>
               <a:rPr lang="en-US" sz="1100" dirty="0">

</xml_diff>